<commit_message>
added when we talk about assignments.
</commit_message>
<xml_diff>
--- a/slides/02_agents_discussion.pptx
+++ b/slides/02_agents_discussion.pptx
@@ -5,7 +5,7 @@
     <p:sldMasterId id="2147483672" r:id="rId1"/>
   </p:sldMasterIdLst>
   <p:notesMasterIdLst>
-    <p:notesMasterId r:id="rId24"/>
+    <p:notesMasterId r:id="rId26"/>
   </p:notesMasterIdLst>
   <p:sldIdLst>
     <p:sldId id="257" r:id="rId2"/>
@@ -18,18 +18,20 @@
     <p:sldId id="318" r:id="rId9"/>
     <p:sldId id="296" r:id="rId10"/>
     <p:sldId id="293" r:id="rId11"/>
-    <p:sldId id="808" r:id="rId12"/>
-    <p:sldId id="305" r:id="rId13"/>
-    <p:sldId id="278" r:id="rId14"/>
-    <p:sldId id="280" r:id="rId15"/>
-    <p:sldId id="809" r:id="rId16"/>
-    <p:sldId id="320" r:id="rId17"/>
-    <p:sldId id="807" r:id="rId18"/>
-    <p:sldId id="295" r:id="rId19"/>
-    <p:sldId id="810" r:id="rId20"/>
-    <p:sldId id="298" r:id="rId21"/>
-    <p:sldId id="802" r:id="rId22"/>
-    <p:sldId id="321" r:id="rId23"/>
+    <p:sldId id="811" r:id="rId12"/>
+    <p:sldId id="808" r:id="rId13"/>
+    <p:sldId id="305" r:id="rId14"/>
+    <p:sldId id="278" r:id="rId15"/>
+    <p:sldId id="280" r:id="rId16"/>
+    <p:sldId id="809" r:id="rId17"/>
+    <p:sldId id="320" r:id="rId18"/>
+    <p:sldId id="807" r:id="rId19"/>
+    <p:sldId id="295" r:id="rId20"/>
+    <p:sldId id="810" r:id="rId21"/>
+    <p:sldId id="298" r:id="rId22"/>
+    <p:sldId id="802" r:id="rId23"/>
+    <p:sldId id="321" r:id="rId24"/>
+    <p:sldId id="812" r:id="rId25"/>
   </p:sldIdLst>
   <p:sldSz cx="9144000" cy="6858000" type="screen4x3"/>
   <p:notesSz cx="7315200" cy="9601200"/>
@@ -10106,7 +10108,7 @@
             <a:fld id="{C590261E-DED2-4ECB-93F0-6041BFF84361}" type="datetimeFigureOut">
               <a:rPr lang="en-US" smtClean="0"/>
               <a:pPr/>
-              <a:t>9/11/2025</a:t>
+              <a:t>9/18/2025</a:t>
             </a:fld>
             <a:endParaRPr lang="en-US"/>
           </a:p>
@@ -10519,7 +10521,7 @@
             <a:fld id="{2754576A-F041-465B-B05C-90CC0BF4FA50}" type="slidenum">
               <a:rPr lang="en-US" smtClean="0"/>
               <a:pPr/>
-              <a:t>16</a:t>
+              <a:t>17</a:t>
             </a:fld>
             <a:endParaRPr lang="en-US"/>
           </a:p>
@@ -10604,7 +10606,7 @@
             <a:fld id="{2754576A-F041-465B-B05C-90CC0BF4FA50}" type="slidenum">
               <a:rPr lang="en-US" smtClean="0"/>
               <a:pPr/>
-              <a:t>18</a:t>
+              <a:t>19</a:t>
             </a:fld>
             <a:endParaRPr lang="en-US"/>
           </a:p>
@@ -10715,7 +10717,7 @@
             <a:fld id="{2754576A-F041-465B-B05C-90CC0BF4FA50}" type="slidenum">
               <a:rPr lang="en-US" smtClean="0"/>
               <a:pPr/>
-              <a:t>19</a:t>
+              <a:t>20</a:t>
             </a:fld>
             <a:endParaRPr lang="en-US"/>
           </a:p>
@@ -10802,7 +10804,7 @@
             <a:fld id="{2754576A-F041-465B-B05C-90CC0BF4FA50}" type="slidenum">
               <a:rPr lang="en-US" smtClean="0"/>
               <a:pPr/>
-              <a:t>20</a:t>
+              <a:t>21</a:t>
             </a:fld>
             <a:endParaRPr lang="en-US"/>
           </a:p>
@@ -11259,7 +11261,7 @@
             <a:fld id="{2754576A-F041-465B-B05C-90CC0BF4FA50}" type="slidenum">
               <a:rPr lang="en-US" smtClean="0"/>
               <a:pPr/>
-              <a:t>12</a:t>
+              <a:t>13</a:t>
             </a:fld>
             <a:endParaRPr lang="en-US"/>
           </a:p>
@@ -11346,7 +11348,7 @@
             <a:fld id="{2754576A-F041-465B-B05C-90CC0BF4FA50}" type="slidenum">
               <a:rPr lang="en-US" smtClean="0"/>
               <a:pPr/>
-              <a:t>13</a:t>
+              <a:t>14</a:t>
             </a:fld>
             <a:endParaRPr lang="en-US"/>
           </a:p>
@@ -11433,7 +11435,7 @@
             <a:fld id="{2754576A-F041-465B-B05C-90CC0BF4FA50}" type="slidenum">
               <a:rPr lang="en-US" smtClean="0"/>
               <a:pPr/>
-              <a:t>14</a:t>
+              <a:t>15</a:t>
             </a:fld>
             <a:endParaRPr lang="en-US"/>
           </a:p>
@@ -11518,7 +11520,7 @@
             <a:fld id="{2754576A-F041-465B-B05C-90CC0BF4FA50}" type="slidenum">
               <a:rPr lang="en-US" smtClean="0"/>
               <a:pPr/>
-              <a:t>15</a:t>
+              <a:t>16</a:t>
             </a:fld>
             <a:endParaRPr lang="en-US"/>
           </a:p>
@@ -15612,6 +15614,92 @@
 <file path=ppt/slides/slide11.xml><?xml version="1.0" encoding="utf-8"?>
 <p:sld xmlns:a="http://schemas.openxmlformats.org/drawingml/2006/main" xmlns:r="http://schemas.openxmlformats.org/officeDocument/2006/relationships" xmlns:p="http://schemas.openxmlformats.org/presentationml/2006/main">
   <p:cSld>
+    <p:spTree>
+      <p:nvGrpSpPr>
+        <p:cNvPr id="1" name=""/>
+        <p:cNvGrpSpPr/>
+        <p:nvPr/>
+      </p:nvGrpSpPr>
+      <p:grpSpPr>
+        <a:xfrm>
+          <a:off x="0" y="0"/>
+          <a:ext cx="0" cy="0"/>
+          <a:chOff x="0" y="0"/>
+          <a:chExt cx="0" cy="0"/>
+        </a:xfrm>
+      </p:grpSpPr>
+      <p:sp>
+        <p:nvSpPr>
+          <p:cNvPr id="4" name="Title 3">
+            <a:extLst>
+              <a:ext uri="{FF2B5EF4-FFF2-40B4-BE49-F238E27FC236}">
+                <a16:creationId xmlns:a16="http://schemas.microsoft.com/office/drawing/2014/main" id="{68184ACE-B0ED-EF17-4DAA-C07670FD36F3}"/>
+              </a:ext>
+            </a:extLst>
+          </p:cNvPr>
+          <p:cNvSpPr>
+            <a:spLocks noGrp="1"/>
+          </p:cNvSpPr>
+          <p:nvPr>
+            <p:ph type="title"/>
+          </p:nvPr>
+        </p:nvSpPr>
+        <p:spPr/>
+        <p:txBody>
+          <a:bodyPr/>
+          <a:lstStyle/>
+          <a:p>
+            <a:r>
+              <a:rPr lang="en-US" dirty="0"/>
+              <a:t>Assignment 1</a:t>
+            </a:r>
+          </a:p>
+        </p:txBody>
+      </p:sp>
+      <p:sp>
+        <p:nvSpPr>
+          <p:cNvPr id="5" name="Text Placeholder 4">
+            <a:extLst>
+              <a:ext uri="{FF2B5EF4-FFF2-40B4-BE49-F238E27FC236}">
+                <a16:creationId xmlns:a16="http://schemas.microsoft.com/office/drawing/2014/main" id="{94BCF58E-5796-DD68-B75D-9D1A6DFE5B20}"/>
+              </a:ext>
+            </a:extLst>
+          </p:cNvPr>
+          <p:cNvSpPr>
+            <a:spLocks noGrp="1"/>
+          </p:cNvSpPr>
+          <p:nvPr>
+            <p:ph type="body" idx="1"/>
+          </p:nvPr>
+        </p:nvSpPr>
+        <p:spPr/>
+        <p:txBody>
+          <a:bodyPr/>
+          <a:lstStyle/>
+          <a:p>
+            <a:r>
+              <a:rPr lang="en-US" dirty="0"/>
+              <a:t>Introduction : Environment</a:t>
+            </a:r>
+          </a:p>
+        </p:txBody>
+      </p:sp>
+    </p:spTree>
+    <p:extLst>
+      <p:ext uri="{BB962C8B-B14F-4D97-AF65-F5344CB8AC3E}">
+        <p14:creationId xmlns:p14="http://schemas.microsoft.com/office/powerpoint/2010/main" val="1154130421"/>
+      </p:ext>
+    </p:extLst>
+  </p:cSld>
+  <p:clrMapOvr>
+    <a:masterClrMapping/>
+  </p:clrMapOvr>
+</p:sld>
+</file>
+
+<file path=ppt/slides/slide12.xml><?xml version="1.0" encoding="utf-8"?>
+<p:sld xmlns:a="http://schemas.openxmlformats.org/drawingml/2006/main" xmlns:r="http://schemas.openxmlformats.org/officeDocument/2006/relationships" xmlns:p="http://schemas.openxmlformats.org/presentationml/2006/main">
+  <p:cSld>
     <p:bg>
       <p:bgPr>
         <a:solidFill>
@@ -15834,7 +15922,7 @@
 </p:sld>
 </file>
 
-<file path=ppt/slides/slide12.xml><?xml version="1.0" encoding="utf-8"?>
+<file path=ppt/slides/slide13.xml><?xml version="1.0" encoding="utf-8"?>
 <p:sld xmlns:a="http://schemas.openxmlformats.org/drawingml/2006/main" xmlns:r="http://schemas.openxmlformats.org/officeDocument/2006/relationships" xmlns:p="http://schemas.openxmlformats.org/presentationml/2006/main">
   <p:cSld>
     <p:spTree>
@@ -17138,7 +17226,7 @@
 </p:sld>
 </file>
 
-<file path=ppt/slides/slide13.xml><?xml version="1.0" encoding="utf-8"?>
+<file path=ppt/slides/slide14.xml><?xml version="1.0" encoding="utf-8"?>
 <p:sld xmlns:a="http://schemas.openxmlformats.org/drawingml/2006/main" xmlns:r="http://schemas.openxmlformats.org/officeDocument/2006/relationships" xmlns:p="http://schemas.openxmlformats.org/presentationml/2006/main">
   <p:cSld>
     <p:spTree>
@@ -17797,7 +17885,7 @@
 </p:sld>
 </file>
 
-<file path=ppt/slides/slide14.xml><?xml version="1.0" encoding="utf-8"?>
+<file path=ppt/slides/slide15.xml><?xml version="1.0" encoding="utf-8"?>
 <p:sld xmlns:a="http://schemas.openxmlformats.org/drawingml/2006/main" xmlns:r="http://schemas.openxmlformats.org/officeDocument/2006/relationships" xmlns:p="http://schemas.openxmlformats.org/presentationml/2006/main">
   <p:cSld>
     <p:spTree>
@@ -19022,7 +19110,7 @@
 </p:sld>
 </file>
 
-<file path=ppt/slides/slide15.xml><?xml version="1.0" encoding="utf-8"?>
+<file path=ppt/slides/slide16.xml><?xml version="1.0" encoding="utf-8"?>
 <p:sld xmlns:a="http://schemas.openxmlformats.org/drawingml/2006/main" xmlns:r="http://schemas.openxmlformats.org/officeDocument/2006/relationships" xmlns:p="http://schemas.openxmlformats.org/presentationml/2006/main">
   <p:cSld>
     <p:spTree>
@@ -19564,7 +19652,7 @@
 </p:sld>
 </file>
 
-<file path=ppt/slides/slide16.xml><?xml version="1.0" encoding="utf-8"?>
+<file path=ppt/slides/slide17.xml><?xml version="1.0" encoding="utf-8"?>
 <p:sld xmlns:a="http://schemas.openxmlformats.org/drawingml/2006/main" xmlns:r="http://schemas.openxmlformats.org/officeDocument/2006/relationships" xmlns:p="http://schemas.openxmlformats.org/presentationml/2006/main">
   <p:cSld>
     <p:spTree>
@@ -20484,7 +20572,7 @@
 </p:sld>
 </file>
 
-<file path=ppt/slides/slide17.xml><?xml version="1.0" encoding="utf-8"?>
+<file path=ppt/slides/slide18.xml><?xml version="1.0" encoding="utf-8"?>
 <p:sld xmlns:a="http://schemas.openxmlformats.org/drawingml/2006/main" xmlns:r="http://schemas.openxmlformats.org/officeDocument/2006/relationships" xmlns:p="http://schemas.openxmlformats.org/presentationml/2006/main">
   <p:cSld>
     <p:bg>
@@ -20705,7 +20793,7 @@
 </p:sld>
 </file>
 
-<file path=ppt/slides/slide18.xml><?xml version="1.0" encoding="utf-8"?>
+<file path=ppt/slides/slide19.xml><?xml version="1.0" encoding="utf-8"?>
 <p:sld xmlns:a="http://schemas.openxmlformats.org/drawingml/2006/main" xmlns:r="http://schemas.openxmlformats.org/officeDocument/2006/relationships" xmlns:p="http://schemas.openxmlformats.org/presentationml/2006/main">
   <p:cSld>
     <p:spTree>
@@ -21051,7 +21139,226 @@
 </p:sld>
 </file>
 
-<file path=ppt/slides/slide19.xml><?xml version="1.0" encoding="utf-8"?>
+<file path=ppt/slides/slide2.xml><?xml version="1.0" encoding="utf-8"?>
+<p:sld xmlns:a="http://schemas.openxmlformats.org/drawingml/2006/main" xmlns:r="http://schemas.openxmlformats.org/officeDocument/2006/relationships" xmlns:p="http://schemas.openxmlformats.org/presentationml/2006/main">
+  <p:cSld>
+    <p:bg>
+      <p:bgPr>
+        <a:solidFill>
+          <a:srgbClr val="000000"/>
+        </a:solidFill>
+        <a:effectLst/>
+      </p:bgPr>
+    </p:bg>
+    <p:spTree>
+      <p:nvGrpSpPr>
+        <p:cNvPr id="1" name=""/>
+        <p:cNvGrpSpPr/>
+        <p:nvPr/>
+      </p:nvGrpSpPr>
+      <p:grpSpPr>
+        <a:xfrm>
+          <a:off x="0" y="0"/>
+          <a:ext cx="0" cy="0"/>
+          <a:chOff x="0" y="0"/>
+          <a:chExt cx="0" cy="0"/>
+        </a:xfrm>
+      </p:grpSpPr>
+      <p:sp>
+        <p:nvSpPr>
+          <p:cNvPr id="11" name="Rectangle 10">
+            <a:extLst>
+              <a:ext uri="{FF2B5EF4-FFF2-40B4-BE49-F238E27FC236}">
+                <a16:creationId xmlns:a16="http://schemas.microsoft.com/office/drawing/2014/main" id="{71B2258F-86CA-4D4D-8270-BC05FCDEBFB3}"/>
+              </a:ext>
+              <a:ext uri="{C183D7F6-B498-43B3-948B-1728B52AA6E4}">
+                <adec:decorative xmlns:adec="http://schemas.microsoft.com/office/drawing/2017/decorative" val="1"/>
+              </a:ext>
+            </a:extLst>
+          </p:cNvPr>
+          <p:cNvSpPr>
+            <a:spLocks noGrp="1" noRot="1" noChangeAspect="1" noMove="1" noResize="1" noEditPoints="1" noAdjustHandles="1" noChangeArrowheads="1" noChangeShapeType="1" noTextEdit="1"/>
+          </p:cNvSpPr>
+          <p:nvPr>
+            <p:extLst>
+              <p:ext uri="{386F3935-93C4-4BCD-93E2-E3B085C9AB24}">
+                <p16:designElem xmlns:p16="http://schemas.microsoft.com/office/powerpoint/2015/main" val="1"/>
+              </p:ext>
+            </p:extLst>
+          </p:nvPr>
+        </p:nvSpPr>
+        <p:spPr>
+          <a:xfrm>
+            <a:off x="0" y="0"/>
+            <a:ext cx="9144000" cy="6857999"/>
+          </a:xfrm>
+          <a:prstGeom prst="rect">
+            <a:avLst/>
+          </a:prstGeom>
+          <a:solidFill>
+            <a:srgbClr val="000000"/>
+          </a:solidFill>
+          <a:ln>
+            <a:noFill/>
+          </a:ln>
+        </p:spPr>
+        <p:style>
+          <a:lnRef idx="2">
+            <a:schemeClr val="accent1">
+              <a:shade val="50000"/>
+            </a:schemeClr>
+          </a:lnRef>
+          <a:fillRef idx="1">
+            <a:schemeClr val="accent1"/>
+          </a:fillRef>
+          <a:effectRef idx="0">
+            <a:schemeClr val="accent1"/>
+          </a:effectRef>
+          <a:fontRef idx="minor">
+            <a:schemeClr val="lt1"/>
+          </a:fontRef>
+        </p:style>
+        <p:txBody>
+          <a:bodyPr rtlCol="0" anchor="ctr"/>
+          <a:lstStyle/>
+          <a:p>
+            <a:pPr algn="ctr"/>
+            <a:endParaRPr lang="en-US"/>
+          </a:p>
+        </p:txBody>
+      </p:sp>
+      <p:pic>
+        <p:nvPicPr>
+          <p:cNvPr id="6" name="Picture 14">
+            <a:extLst>
+              <a:ext uri="{FF2B5EF4-FFF2-40B4-BE49-F238E27FC236}">
+                <a16:creationId xmlns:a16="http://schemas.microsoft.com/office/drawing/2014/main" id="{E4F041C0-7D5C-CB2F-92DA-37E6B770851E}"/>
+              </a:ext>
+              <a:ext uri="{C183D7F6-B498-43B3-948B-1728B52AA6E4}">
+                <adec:decorative xmlns:adec="http://schemas.microsoft.com/office/drawing/2017/decorative" val="1"/>
+              </a:ext>
+            </a:extLst>
+          </p:cNvPr>
+          <p:cNvPicPr>
+            <a:picLocks noChangeAspect="1" noChangeArrowheads="1"/>
+          </p:cNvPicPr>
+          <p:nvPr/>
+        </p:nvPicPr>
+        <p:blipFill rotWithShape="1">
+          <a:blip r:embed="rId2" cstate="print">
+            <a:alphaModFix amt="50000"/>
+          </a:blip>
+          <a:srcRect t="27493" b="22444"/>
+          <a:stretch>
+            <a:fillRect/>
+          </a:stretch>
+        </p:blipFill>
+        <p:spPr bwMode="auto">
+          <a:xfrm>
+            <a:off x="20" y="1"/>
+            <a:ext cx="9143980" cy="6857999"/>
+          </a:xfrm>
+          <a:prstGeom prst="rect">
+            <a:avLst/>
+          </a:prstGeom>
+          <a:noFill/>
+        </p:spPr>
+      </p:pic>
+      <p:sp>
+        <p:nvSpPr>
+          <p:cNvPr id="4" name="Title 3">
+            <a:extLst>
+              <a:ext uri="{FF2B5EF4-FFF2-40B4-BE49-F238E27FC236}">
+                <a16:creationId xmlns:a16="http://schemas.microsoft.com/office/drawing/2014/main" id="{110C9F2C-5F20-241B-A7B4-23BCD535D7A9}"/>
+              </a:ext>
+            </a:extLst>
+          </p:cNvPr>
+          <p:cNvSpPr>
+            <a:spLocks noGrp="1"/>
+          </p:cNvSpPr>
+          <p:nvPr>
+            <p:ph type="title"/>
+          </p:nvPr>
+        </p:nvSpPr>
+        <p:spPr>
+          <a:xfrm>
+            <a:off x="1143000" y="1122362"/>
+            <a:ext cx="6858000" cy="2900518"/>
+          </a:xfrm>
+        </p:spPr>
+        <p:txBody>
+          <a:bodyPr vert="horz" lIns="91440" tIns="45720" rIns="91440" bIns="45720" rtlCol="0" anchor="b">
+            <a:normAutofit/>
+          </a:bodyPr>
+          <a:lstStyle/>
+          <a:p>
+            <a:pPr algn="ctr" defTabSz="914400"/>
+            <a:r>
+              <a:rPr lang="en-US" sz="6000" dirty="0">
+                <a:solidFill>
+                  <a:srgbClr val="FFFFFF"/>
+                </a:solidFill>
+              </a:rPr>
+              <a:t>Module Review 1</a:t>
+            </a:r>
+          </a:p>
+        </p:txBody>
+      </p:sp>
+      <p:sp>
+        <p:nvSpPr>
+          <p:cNvPr id="5" name="Text Placeholder 4">
+            <a:extLst>
+              <a:ext uri="{FF2B5EF4-FFF2-40B4-BE49-F238E27FC236}">
+                <a16:creationId xmlns:a16="http://schemas.microsoft.com/office/drawing/2014/main" id="{702CF149-4E3E-4BC7-1591-E633BE8275BB}"/>
+              </a:ext>
+            </a:extLst>
+          </p:cNvPr>
+          <p:cNvSpPr>
+            <a:spLocks noGrp="1"/>
+          </p:cNvSpPr>
+          <p:nvPr>
+            <p:ph type="body" idx="1"/>
+          </p:nvPr>
+        </p:nvSpPr>
+        <p:spPr>
+          <a:xfrm>
+            <a:off x="1143000" y="4159404"/>
+            <a:ext cx="6858000" cy="1098395"/>
+          </a:xfrm>
+        </p:spPr>
+        <p:txBody>
+          <a:bodyPr vert="horz" lIns="91440" tIns="45720" rIns="91440" bIns="45720" rtlCol="0">
+            <a:normAutofit/>
+          </a:bodyPr>
+          <a:lstStyle/>
+          <a:p>
+            <a:pPr algn="ctr" defTabSz="914400">
+              <a:spcBef>
+                <a:spcPts val="1000"/>
+              </a:spcBef>
+            </a:pPr>
+            <a:endParaRPr lang="en-US" sz="2400">
+              <a:solidFill>
+                <a:srgbClr val="FFFFFF"/>
+              </a:solidFill>
+            </a:endParaRPr>
+          </a:p>
+        </p:txBody>
+      </p:sp>
+    </p:spTree>
+    <p:extLst>
+      <p:ext uri="{BB962C8B-B14F-4D97-AF65-F5344CB8AC3E}">
+        <p14:creationId xmlns:p14="http://schemas.microsoft.com/office/powerpoint/2010/main" val="499141692"/>
+      </p:ext>
+    </p:extLst>
+  </p:cSld>
+  <p:clrMapOvr>
+    <a:overrideClrMapping bg1="dk1" tx1="lt1" bg2="dk2" tx2="lt2" accent1="accent1" accent2="accent2" accent3="accent3" accent4="accent4" accent5="accent5" accent6="accent6" hlink="hlink" folHlink="folHlink"/>
+  </p:clrMapOvr>
+</p:sld>
+</file>
+
+<file path=ppt/slides/slide20.xml><?xml version="1.0" encoding="utf-8"?>
 <p:sld xmlns:a="http://schemas.openxmlformats.org/drawingml/2006/main" xmlns:r="http://schemas.openxmlformats.org/officeDocument/2006/relationships" xmlns:p="http://schemas.openxmlformats.org/presentationml/2006/main">
   <p:cSld>
     <p:spTree>
@@ -21099,347 +21406,6 @@
               <a:rPr lang="en-US" dirty="0"/>
               <a:t>Environment for a Self-Driving Car</a:t>
             </a:r>
-          </a:p>
-        </p:txBody>
-      </p:sp>
-      <p:sp>
-        <p:nvSpPr>
-          <p:cNvPr id="7" name="TextBox 6">
-            <a:extLst>
-              <a:ext uri="{FF2B5EF4-FFF2-40B4-BE49-F238E27FC236}">
-                <a16:creationId xmlns:a16="http://schemas.microsoft.com/office/drawing/2014/main" id="{AB7D9275-A093-9438-1831-775CEF49E280}"/>
-              </a:ext>
-            </a:extLst>
-          </p:cNvPr>
-          <p:cNvSpPr txBox="1"/>
-          <p:nvPr/>
-        </p:nvSpPr>
-        <p:spPr>
-          <a:xfrm>
-            <a:off x="731044" y="1645754"/>
-            <a:ext cx="3124200" cy="738664"/>
-          </a:xfrm>
-          <a:prstGeom prst="rect">
-            <a:avLst/>
-          </a:prstGeom>
-          <a:noFill/>
-        </p:spPr>
-        <p:txBody>
-          <a:bodyPr wrap="square">
-            <a:spAutoFit/>
-          </a:bodyPr>
-          <a:lstStyle/>
-          <a:p>
-            <a:pPr marL="0" indent="0">
-              <a:buNone/>
-            </a:pPr>
-            <a:r>
-              <a:rPr lang="en-US" sz="1400" b="1" dirty="0">
-                <a:solidFill>
-                  <a:srgbClr val="FF0000"/>
-                </a:solidFill>
-              </a:rPr>
-              <a:t>Fully observable: </a:t>
-            </a:r>
-            <a:r>
-              <a:rPr lang="en-US" sz="1400" dirty="0"/>
-              <a:t>The agent has access to the complete current </a:t>
-            </a:r>
-            <a:r>
-              <a:rPr lang="en-US" sz="1400" b="1" dirty="0"/>
-              <a:t>state </a:t>
-            </a:r>
-            <a:r>
-              <a:rPr lang="en-US" sz="1400" dirty="0"/>
-              <a:t>of the environment.</a:t>
-            </a:r>
-            <a:endParaRPr lang="en-US" sz="1400" b="1" dirty="0">
-              <a:solidFill>
-                <a:srgbClr val="FF0000"/>
-              </a:solidFill>
-            </a:endParaRPr>
-          </a:p>
-        </p:txBody>
-      </p:sp>
-      <p:sp>
-        <p:nvSpPr>
-          <p:cNvPr id="3" name="TextBox 2">
-            <a:extLst>
-              <a:ext uri="{FF2B5EF4-FFF2-40B4-BE49-F238E27FC236}">
-                <a16:creationId xmlns:a16="http://schemas.microsoft.com/office/drawing/2014/main" id="{DA5A99D2-DBCA-F975-9400-EA69F8E5B146}"/>
-              </a:ext>
-            </a:extLst>
-          </p:cNvPr>
-          <p:cNvSpPr txBox="1"/>
-          <p:nvPr/>
-        </p:nvSpPr>
-        <p:spPr>
-          <a:xfrm>
-            <a:off x="3902869" y="1685808"/>
-            <a:ext cx="590550" cy="369332"/>
-          </a:xfrm>
-          <a:prstGeom prst="rect">
-            <a:avLst/>
-          </a:prstGeom>
-          <a:noFill/>
-        </p:spPr>
-        <p:txBody>
-          <a:bodyPr wrap="square" rtlCol="0">
-            <a:spAutoFit/>
-          </a:bodyPr>
-          <a:lstStyle/>
-          <a:p>
-            <a:r>
-              <a:rPr lang="en-US" b="1" dirty="0">
-                <a:solidFill>
-                  <a:srgbClr val="FF0000"/>
-                </a:solidFill>
-              </a:rPr>
-              <a:t>vs.</a:t>
-            </a:r>
-          </a:p>
-        </p:txBody>
-      </p:sp>
-      <p:sp>
-        <p:nvSpPr>
-          <p:cNvPr id="9" name="TextBox 8">
-            <a:extLst>
-              <a:ext uri="{FF2B5EF4-FFF2-40B4-BE49-F238E27FC236}">
-                <a16:creationId xmlns:a16="http://schemas.microsoft.com/office/drawing/2014/main" id="{73BCD054-D3C1-1A6E-BA7E-A99E78CFF527}"/>
-              </a:ext>
-            </a:extLst>
-          </p:cNvPr>
-          <p:cNvSpPr txBox="1"/>
-          <p:nvPr/>
-        </p:nvSpPr>
-        <p:spPr>
-          <a:xfrm>
-            <a:off x="4687491" y="1600200"/>
-            <a:ext cx="3495676" cy="738664"/>
-          </a:xfrm>
-          <a:prstGeom prst="rect">
-            <a:avLst/>
-          </a:prstGeom>
-          <a:noFill/>
-        </p:spPr>
-        <p:txBody>
-          <a:bodyPr wrap="square">
-            <a:spAutoFit/>
-          </a:bodyPr>
-          <a:lstStyle/>
-          <a:p>
-            <a:r>
-              <a:rPr lang="en-US" sz="1400" b="1" dirty="0">
-                <a:solidFill>
-                  <a:srgbClr val="FF0000"/>
-                </a:solidFill>
-              </a:rPr>
-              <a:t>Partially observable: </a:t>
-            </a:r>
-            <a:r>
-              <a:rPr lang="en-US" sz="1400" dirty="0"/>
-              <a:t>The agent’s  sensors provide incomplete or noisy information about the state of the environment.</a:t>
-            </a:r>
-          </a:p>
-        </p:txBody>
-      </p:sp>
-      <p:sp>
-        <p:nvSpPr>
-          <p:cNvPr id="11" name="TextBox 10">
-            <a:extLst>
-              <a:ext uri="{FF2B5EF4-FFF2-40B4-BE49-F238E27FC236}">
-                <a16:creationId xmlns:a16="http://schemas.microsoft.com/office/drawing/2014/main" id="{DD8323B0-5128-032E-1E85-CB3D5DD61D51}"/>
-              </a:ext>
-            </a:extLst>
-          </p:cNvPr>
-          <p:cNvSpPr txBox="1"/>
-          <p:nvPr/>
-        </p:nvSpPr>
-        <p:spPr>
-          <a:xfrm>
-            <a:off x="713261" y="2531232"/>
-            <a:ext cx="3352800" cy="1815882"/>
-          </a:xfrm>
-          <a:prstGeom prst="rect">
-            <a:avLst/>
-          </a:prstGeom>
-          <a:noFill/>
-        </p:spPr>
-        <p:txBody>
-          <a:bodyPr wrap="square">
-            <a:spAutoFit/>
-          </a:bodyPr>
-          <a:lstStyle/>
-          <a:p>
-            <a:pPr marL="0" indent="0">
-              <a:buNone/>
-            </a:pPr>
-            <a:r>
-              <a:rPr lang="en-US" sz="1400" b="1" dirty="0">
-                <a:solidFill>
-                  <a:srgbClr val="FF0000"/>
-                </a:solidFill>
-              </a:rPr>
-              <a:t>Deterministic: </a:t>
-            </a:r>
-          </a:p>
-          <a:p>
-            <a:pPr marL="342900" indent="-342900">
-              <a:buFont typeface="+mj-lt"/>
-              <a:buAutoNum type="alphaLcParenR"/>
-            </a:pPr>
-            <a:r>
-              <a:rPr lang="en-US" sz="1400" dirty="0"/>
-              <a:t>Deterministic </a:t>
-            </a:r>
-            <a:r>
-              <a:rPr lang="en-US" sz="1400" b="1" dirty="0"/>
-              <a:t>percepts</a:t>
-            </a:r>
-            <a:r>
-              <a:rPr lang="en-US" sz="1400" dirty="0"/>
-              <a:t> are 100% reliable</a:t>
-            </a:r>
-          </a:p>
-          <a:p>
-            <a:pPr marL="342900" indent="-342900">
-              <a:buFont typeface="+mj-lt"/>
-              <a:buAutoNum type="alphaLcParenR"/>
-            </a:pPr>
-            <a:r>
-              <a:rPr lang="en-US" sz="1400" dirty="0"/>
-              <a:t>Deterministic </a:t>
-            </a:r>
-            <a:r>
-              <a:rPr lang="en-US" sz="1400" b="1" dirty="0"/>
-              <a:t>transition function</a:t>
-            </a:r>
-            <a:r>
-              <a:rPr lang="en-US" sz="1400" dirty="0"/>
-              <a:t>: Changes in the environment are completely determined by the current state of the environment and the agent’s action.</a:t>
-            </a:r>
-          </a:p>
-        </p:txBody>
-      </p:sp>
-      <p:sp>
-        <p:nvSpPr>
-          <p:cNvPr id="4" name="TextBox 3">
-            <a:extLst>
-              <a:ext uri="{FF2B5EF4-FFF2-40B4-BE49-F238E27FC236}">
-                <a16:creationId xmlns:a16="http://schemas.microsoft.com/office/drawing/2014/main" id="{EBB1364B-968D-ED21-F335-F7B024829714}"/>
-              </a:ext>
-            </a:extLst>
-          </p:cNvPr>
-          <p:cNvSpPr txBox="1"/>
-          <p:nvPr/>
-        </p:nvSpPr>
-        <p:spPr>
-          <a:xfrm>
-            <a:off x="3902869" y="2878457"/>
-            <a:ext cx="590550" cy="369332"/>
-          </a:xfrm>
-          <a:prstGeom prst="rect">
-            <a:avLst/>
-          </a:prstGeom>
-          <a:noFill/>
-        </p:spPr>
-        <p:txBody>
-          <a:bodyPr wrap="square" rtlCol="0">
-            <a:spAutoFit/>
-          </a:bodyPr>
-          <a:lstStyle/>
-          <a:p>
-            <a:r>
-              <a:rPr lang="en-US" b="1" dirty="0">
-                <a:solidFill>
-                  <a:srgbClr val="FF0000"/>
-                </a:solidFill>
-              </a:rPr>
-              <a:t>vs.</a:t>
-            </a:r>
-          </a:p>
-        </p:txBody>
-      </p:sp>
-      <p:sp>
-        <p:nvSpPr>
-          <p:cNvPr id="13" name="TextBox 12">
-            <a:extLst>
-              <a:ext uri="{FF2B5EF4-FFF2-40B4-BE49-F238E27FC236}">
-                <a16:creationId xmlns:a16="http://schemas.microsoft.com/office/drawing/2014/main" id="{F2FCE8FC-9E62-EE31-4861-AC71C50C1CDC}"/>
-              </a:ext>
-            </a:extLst>
-          </p:cNvPr>
-          <p:cNvSpPr txBox="1"/>
-          <p:nvPr/>
-        </p:nvSpPr>
-        <p:spPr>
-          <a:xfrm>
-            <a:off x="4726781" y="2514600"/>
-            <a:ext cx="3807619" cy="2031325"/>
-          </a:xfrm>
-          <a:prstGeom prst="rect">
-            <a:avLst/>
-          </a:prstGeom>
-          <a:noFill/>
-        </p:spPr>
-        <p:txBody>
-          <a:bodyPr wrap="square">
-            <a:spAutoFit/>
-          </a:bodyPr>
-          <a:lstStyle/>
-          <a:p>
-            <a:pPr marL="0" indent="0">
-              <a:buNone/>
-            </a:pPr>
-            <a:r>
-              <a:rPr lang="en-US" sz="1400" b="1" dirty="0">
-                <a:solidFill>
-                  <a:srgbClr val="FF0000"/>
-                </a:solidFill>
-              </a:rPr>
-              <a:t>Stochastic: </a:t>
-            </a:r>
-          </a:p>
-          <a:p>
-            <a:pPr marL="342900" indent="-342900">
-              <a:buFont typeface="+mj-lt"/>
-              <a:buAutoNum type="alphaLcParenR"/>
-            </a:pPr>
-            <a:r>
-              <a:rPr lang="en-US" sz="1400" dirty="0"/>
-              <a:t>Stochastic </a:t>
-            </a:r>
-            <a:r>
-              <a:rPr lang="en-US" sz="1400" b="1" dirty="0"/>
-              <a:t>percepts</a:t>
-            </a:r>
-            <a:r>
-              <a:rPr lang="en-US" sz="1400" dirty="0"/>
-              <a:t> are unreliable (noise distribution, sensor failure probability, error model, etc.). This is called a stochastic sensor model.</a:t>
-            </a:r>
-            <a:endParaRPr lang="en-US" dirty="0"/>
-          </a:p>
-          <a:p>
-            <a:pPr marL="342900" indent="-342900">
-              <a:buFont typeface="+mj-lt"/>
-              <a:buAutoNum type="alphaLcParenR"/>
-            </a:pPr>
-            <a:r>
-              <a:rPr lang="en-US" sz="1400" dirty="0"/>
-              <a:t>Stochastic </a:t>
-            </a:r>
-            <a:r>
-              <a:rPr lang="en-US" sz="1400" b="1" dirty="0"/>
-              <a:t>transition function:  </a:t>
-            </a:r>
-            <a:r>
-              <a:rPr lang="en-US" sz="1400" dirty="0"/>
-              <a:t>leads to transition probabilities and a Markov process.</a:t>
-            </a:r>
-            <a:br>
-              <a:rPr lang="en-US" sz="1400" dirty="0"/>
-            </a:br>
-            <a:endParaRPr lang="en-US" sz="1400" dirty="0"/>
           </a:p>
         </p:txBody>
       </p:sp>
@@ -21738,291 +21704,6 @@
       </p:pic>
       <p:sp>
         <p:nvSpPr>
-          <p:cNvPr id="6" name="Rectangle 5">
-            <a:extLst>
-              <a:ext uri="{FF2B5EF4-FFF2-40B4-BE49-F238E27FC236}">
-                <a16:creationId xmlns:a16="http://schemas.microsoft.com/office/drawing/2014/main" id="{E36777DE-AA6F-36FB-ED43-4E64D2985733}"/>
-              </a:ext>
-              <a:ext uri="{C183D7F6-B498-43B3-948B-1728B52AA6E4}">
-                <adec:decorative xmlns:adec="http://schemas.microsoft.com/office/drawing/2017/decorative" val="1"/>
-              </a:ext>
-            </a:extLst>
-          </p:cNvPr>
-          <p:cNvSpPr/>
-          <p:nvPr/>
-        </p:nvSpPr>
-        <p:spPr>
-          <a:xfrm>
-            <a:off x="569272" y="1747024"/>
-            <a:ext cx="150019" cy="152400"/>
-          </a:xfrm>
-          <a:prstGeom prst="rect">
-            <a:avLst/>
-          </a:prstGeom>
-          <a:noFill/>
-          <a:ln w="28575" cap="flat" cmpd="sng" algn="ctr">
-            <a:solidFill>
-              <a:schemeClr val="dk1"/>
-            </a:solidFill>
-            <a:prstDash val="solid"/>
-            <a:round/>
-            <a:headEnd type="none" w="med" len="med"/>
-            <a:tailEnd type="none" w="med" len="med"/>
-          </a:ln>
-        </p:spPr>
-        <p:style>
-          <a:lnRef idx="0">
-            <a:scrgbClr r="0" g="0" b="0"/>
-          </a:lnRef>
-          <a:fillRef idx="0">
-            <a:scrgbClr r="0" g="0" b="0"/>
-          </a:fillRef>
-          <a:effectRef idx="0">
-            <a:scrgbClr r="0" g="0" b="0"/>
-          </a:effectRef>
-          <a:fontRef idx="minor">
-            <a:schemeClr val="dk1"/>
-          </a:fontRef>
-        </p:style>
-        <p:txBody>
-          <a:bodyPr rtlCol="0" anchor="ctr"/>
-          <a:lstStyle/>
-          <a:p>
-            <a:pPr algn="ctr"/>
-            <a:endParaRPr lang="en-US"/>
-          </a:p>
-        </p:txBody>
-      </p:sp>
-      <p:sp>
-        <p:nvSpPr>
-          <p:cNvPr id="12" name="Rectangle 11">
-            <a:extLst>
-              <a:ext uri="{FF2B5EF4-FFF2-40B4-BE49-F238E27FC236}">
-                <a16:creationId xmlns:a16="http://schemas.microsoft.com/office/drawing/2014/main" id="{4C604242-1862-80C5-1182-4D821FA1B887}"/>
-              </a:ext>
-              <a:ext uri="{C183D7F6-B498-43B3-948B-1728B52AA6E4}">
-                <adec:decorative xmlns:adec="http://schemas.microsoft.com/office/drawing/2017/decorative" val="1"/>
-              </a:ext>
-            </a:extLst>
-          </p:cNvPr>
-          <p:cNvSpPr/>
-          <p:nvPr/>
-        </p:nvSpPr>
-        <p:spPr>
-          <a:xfrm>
-            <a:off x="4553525" y="1702769"/>
-            <a:ext cx="150019" cy="152400"/>
-          </a:xfrm>
-          <a:prstGeom prst="rect">
-            <a:avLst/>
-          </a:prstGeom>
-          <a:noFill/>
-          <a:ln w="28575" cap="flat" cmpd="sng" algn="ctr">
-            <a:solidFill>
-              <a:schemeClr val="dk1"/>
-            </a:solidFill>
-            <a:prstDash val="solid"/>
-            <a:round/>
-            <a:headEnd type="none" w="med" len="med"/>
-            <a:tailEnd type="none" w="med" len="med"/>
-          </a:ln>
-        </p:spPr>
-        <p:style>
-          <a:lnRef idx="0">
-            <a:scrgbClr r="0" g="0" b="0"/>
-          </a:lnRef>
-          <a:fillRef idx="0">
-            <a:scrgbClr r="0" g="0" b="0"/>
-          </a:fillRef>
-          <a:effectRef idx="0">
-            <a:scrgbClr r="0" g="0" b="0"/>
-          </a:effectRef>
-          <a:fontRef idx="minor">
-            <a:schemeClr val="dk1"/>
-          </a:fontRef>
-        </p:style>
-        <p:txBody>
-          <a:bodyPr rtlCol="0" anchor="ctr"/>
-          <a:lstStyle/>
-          <a:p>
-            <a:pPr algn="ctr"/>
-            <a:endParaRPr lang="en-US"/>
-          </a:p>
-        </p:txBody>
-      </p:sp>
-      <p:sp>
-        <p:nvSpPr>
-          <p:cNvPr id="14" name="Rectangle 13">
-            <a:extLst>
-              <a:ext uri="{FF2B5EF4-FFF2-40B4-BE49-F238E27FC236}">
-                <a16:creationId xmlns:a16="http://schemas.microsoft.com/office/drawing/2014/main" id="{A9F74705-281C-7A35-DDF0-E58E8B51997A}"/>
-              </a:ext>
-              <a:ext uri="{C183D7F6-B498-43B3-948B-1728B52AA6E4}">
-                <adec:decorative xmlns:adec="http://schemas.microsoft.com/office/drawing/2017/decorative" val="1"/>
-              </a:ext>
-            </a:extLst>
-          </p:cNvPr>
-          <p:cNvSpPr/>
-          <p:nvPr/>
-        </p:nvSpPr>
-        <p:spPr>
-          <a:xfrm>
-            <a:off x="569271" y="2836788"/>
-            <a:ext cx="150019" cy="152400"/>
-          </a:xfrm>
-          <a:prstGeom prst="rect">
-            <a:avLst/>
-          </a:prstGeom>
-          <a:noFill/>
-          <a:ln w="28575" cap="flat" cmpd="sng" algn="ctr">
-            <a:solidFill>
-              <a:schemeClr val="dk1"/>
-            </a:solidFill>
-            <a:prstDash val="solid"/>
-            <a:round/>
-            <a:headEnd type="none" w="med" len="med"/>
-            <a:tailEnd type="none" w="med" len="med"/>
-          </a:ln>
-        </p:spPr>
-        <p:style>
-          <a:lnRef idx="0">
-            <a:scrgbClr r="0" g="0" b="0"/>
-          </a:lnRef>
-          <a:fillRef idx="0">
-            <a:scrgbClr r="0" g="0" b="0"/>
-          </a:fillRef>
-          <a:effectRef idx="0">
-            <a:scrgbClr r="0" g="0" b="0"/>
-          </a:effectRef>
-          <a:fontRef idx="minor">
-            <a:schemeClr val="dk1"/>
-          </a:fontRef>
-        </p:style>
-        <p:txBody>
-          <a:bodyPr rtlCol="0" anchor="ctr"/>
-          <a:lstStyle/>
-          <a:p>
-            <a:pPr algn="ctr"/>
-            <a:endParaRPr lang="en-US"/>
-          </a:p>
-        </p:txBody>
-      </p:sp>
-      <p:sp>
-        <p:nvSpPr>
-          <p:cNvPr id="16" name="Rectangle 15">
-            <a:extLst>
-              <a:ext uri="{FF2B5EF4-FFF2-40B4-BE49-F238E27FC236}">
-                <a16:creationId xmlns:a16="http://schemas.microsoft.com/office/drawing/2014/main" id="{ACF94FC6-793A-6FFA-2D73-FB582A2DBCCA}"/>
-              </a:ext>
-              <a:ext uri="{C183D7F6-B498-43B3-948B-1728B52AA6E4}">
-                <adec:decorative xmlns:adec="http://schemas.microsoft.com/office/drawing/2017/decorative" val="1"/>
-              </a:ext>
-            </a:extLst>
-          </p:cNvPr>
-          <p:cNvSpPr/>
-          <p:nvPr/>
-        </p:nvSpPr>
-        <p:spPr>
-          <a:xfrm>
-            <a:off x="575598" y="3257530"/>
-            <a:ext cx="150019" cy="152400"/>
-          </a:xfrm>
-          <a:prstGeom prst="rect">
-            <a:avLst/>
-          </a:prstGeom>
-          <a:noFill/>
-          <a:ln w="28575" cap="flat" cmpd="sng" algn="ctr">
-            <a:solidFill>
-              <a:schemeClr val="dk1"/>
-            </a:solidFill>
-            <a:prstDash val="solid"/>
-            <a:round/>
-            <a:headEnd type="none" w="med" len="med"/>
-            <a:tailEnd type="none" w="med" len="med"/>
-          </a:ln>
-        </p:spPr>
-        <p:style>
-          <a:lnRef idx="0">
-            <a:scrgbClr r="0" g="0" b="0"/>
-          </a:lnRef>
-          <a:fillRef idx="0">
-            <a:scrgbClr r="0" g="0" b="0"/>
-          </a:fillRef>
-          <a:effectRef idx="0">
-            <a:scrgbClr r="0" g="0" b="0"/>
-          </a:effectRef>
-          <a:fontRef idx="minor">
-            <a:schemeClr val="dk1"/>
-          </a:fontRef>
-        </p:style>
-        <p:txBody>
-          <a:bodyPr rtlCol="0" anchor="ctr"/>
-          <a:lstStyle/>
-          <a:p>
-            <a:pPr algn="ctr"/>
-            <a:endParaRPr lang="en-US"/>
-          </a:p>
-        </p:txBody>
-      </p:sp>
-      <p:sp>
-        <p:nvSpPr>
-          <p:cNvPr id="19" name="Rectangle 18">
-            <a:extLst>
-              <a:ext uri="{FF2B5EF4-FFF2-40B4-BE49-F238E27FC236}">
-                <a16:creationId xmlns:a16="http://schemas.microsoft.com/office/drawing/2014/main" id="{587F5464-4C74-041C-33AC-55DD2C7B21FC}"/>
-              </a:ext>
-              <a:ext uri="{C183D7F6-B498-43B3-948B-1728B52AA6E4}">
-                <adec:decorative xmlns:adec="http://schemas.microsoft.com/office/drawing/2017/decorative" val="1"/>
-              </a:ext>
-            </a:extLst>
-          </p:cNvPr>
-          <p:cNvSpPr/>
-          <p:nvPr/>
-        </p:nvSpPr>
-        <p:spPr>
-          <a:xfrm>
-            <a:off x="4553525" y="2808475"/>
-            <a:ext cx="150019" cy="152400"/>
-          </a:xfrm>
-          <a:prstGeom prst="rect">
-            <a:avLst/>
-          </a:prstGeom>
-          <a:noFill/>
-          <a:ln w="28575" cap="flat" cmpd="sng" algn="ctr">
-            <a:solidFill>
-              <a:schemeClr val="dk1"/>
-            </a:solidFill>
-            <a:prstDash val="solid"/>
-            <a:round/>
-            <a:headEnd type="none" w="med" len="med"/>
-            <a:tailEnd type="none" w="med" len="med"/>
-          </a:ln>
-        </p:spPr>
-        <p:style>
-          <a:lnRef idx="0">
-            <a:scrgbClr r="0" g="0" b="0"/>
-          </a:lnRef>
-          <a:fillRef idx="0">
-            <a:scrgbClr r="0" g="0" b="0"/>
-          </a:fillRef>
-          <a:effectRef idx="0">
-            <a:scrgbClr r="0" g="0" b="0"/>
-          </a:effectRef>
-          <a:fontRef idx="minor">
-            <a:schemeClr val="dk1"/>
-          </a:fontRef>
-        </p:style>
-        <p:txBody>
-          <a:bodyPr rtlCol="0" anchor="ctr"/>
-          <a:lstStyle/>
-          <a:p>
-            <a:pPr algn="ctr"/>
-            <a:endParaRPr lang="en-US"/>
-          </a:p>
-        </p:txBody>
-      </p:sp>
-      <p:sp>
-        <p:nvSpPr>
           <p:cNvPr id="20" name="Rectangle 19">
             <a:extLst>
               <a:ext uri="{FF2B5EF4-FFF2-40B4-BE49-F238E27FC236}">
@@ -22038,64 +21719,7 @@
         </p:nvSpPr>
         <p:spPr>
           <a:xfrm>
-            <a:off x="573175" y="4565077"/>
-            <a:ext cx="150019" cy="152400"/>
-          </a:xfrm>
-          <a:prstGeom prst="rect">
-            <a:avLst/>
-          </a:prstGeom>
-          <a:noFill/>
-          <a:ln w="28575" cap="flat" cmpd="sng" algn="ctr">
-            <a:solidFill>
-              <a:schemeClr val="dk1"/>
-            </a:solidFill>
-            <a:prstDash val="solid"/>
-            <a:round/>
-            <a:headEnd type="none" w="med" len="med"/>
-            <a:tailEnd type="none" w="med" len="med"/>
-          </a:ln>
-        </p:spPr>
-        <p:style>
-          <a:lnRef idx="0">
-            <a:scrgbClr r="0" g="0" b="0"/>
-          </a:lnRef>
-          <a:fillRef idx="0">
-            <a:scrgbClr r="0" g="0" b="0"/>
-          </a:fillRef>
-          <a:effectRef idx="0">
-            <a:scrgbClr r="0" g="0" b="0"/>
-          </a:effectRef>
-          <a:fontRef idx="minor">
-            <a:schemeClr val="dk1"/>
-          </a:fontRef>
-        </p:style>
-        <p:txBody>
-          <a:bodyPr rtlCol="0" anchor="ctr"/>
-          <a:lstStyle/>
-          <a:p>
-            <a:pPr algn="ctr"/>
-            <a:endParaRPr lang="en-US"/>
-          </a:p>
-        </p:txBody>
-      </p:sp>
-      <p:sp>
-        <p:nvSpPr>
-          <p:cNvPr id="21" name="Rectangle 20">
-            <a:extLst>
-              <a:ext uri="{FF2B5EF4-FFF2-40B4-BE49-F238E27FC236}">
-                <a16:creationId xmlns:a16="http://schemas.microsoft.com/office/drawing/2014/main" id="{F0068770-5CFD-EB6E-6867-85848C2ADDD6}"/>
-              </a:ext>
-              <a:ext uri="{C183D7F6-B498-43B3-948B-1728B52AA6E4}">
-                <adec:decorative xmlns:adec="http://schemas.microsoft.com/office/drawing/2017/decorative" val="1"/>
-              </a:ext>
-            </a:extLst>
-          </p:cNvPr>
-          <p:cNvSpPr/>
-          <p:nvPr/>
-        </p:nvSpPr>
-        <p:spPr>
-          <a:xfrm>
-            <a:off x="4553525" y="3469756"/>
+            <a:off x="555807" y="4565077"/>
             <a:ext cx="150019" cy="152400"/>
           </a:xfrm>
           <a:prstGeom prst="rect">
@@ -22348,7 +21972,7 @@
         </p:nvSpPr>
         <p:spPr>
           <a:xfrm>
-            <a:off x="538438" y="5146363"/>
+            <a:off x="555807" y="5146363"/>
             <a:ext cx="150019" cy="152400"/>
           </a:xfrm>
           <a:prstGeom prst="rect">
@@ -22445,6 +22069,554 @@
           </a:p>
         </p:txBody>
       </p:sp>
+      <p:sp>
+        <p:nvSpPr>
+          <p:cNvPr id="28" name="TextBox 27">
+            <a:extLst>
+              <a:ext uri="{FF2B5EF4-FFF2-40B4-BE49-F238E27FC236}">
+                <a16:creationId xmlns:a16="http://schemas.microsoft.com/office/drawing/2014/main" id="{E7197E3B-C307-F8C3-9E4B-43987DE3D68C}"/>
+              </a:ext>
+            </a:extLst>
+          </p:cNvPr>
+          <p:cNvSpPr txBox="1"/>
+          <p:nvPr/>
+        </p:nvSpPr>
+        <p:spPr>
+          <a:xfrm>
+            <a:off x="731044" y="1645754"/>
+            <a:ext cx="3124200" cy="1384995"/>
+          </a:xfrm>
+          <a:prstGeom prst="rect">
+            <a:avLst/>
+          </a:prstGeom>
+          <a:noFill/>
+        </p:spPr>
+        <p:txBody>
+          <a:bodyPr wrap="square">
+            <a:spAutoFit/>
+          </a:bodyPr>
+          <a:lstStyle/>
+          <a:p>
+            <a:r>
+              <a:rPr lang="en-US" sz="1400" b="1" dirty="0">
+                <a:solidFill>
+                  <a:srgbClr val="FF0000"/>
+                </a:solidFill>
+              </a:rPr>
+              <a:t>Fully observable: </a:t>
+            </a:r>
+            <a:r>
+              <a:rPr lang="en-US" sz="1400" dirty="0"/>
+              <a:t>The agent has access to the complete current </a:t>
+            </a:r>
+            <a:r>
+              <a:rPr lang="en-US" sz="1400" b="1" dirty="0"/>
+              <a:t>state </a:t>
+            </a:r>
+            <a:r>
+              <a:rPr lang="en-US" sz="1400" dirty="0"/>
+              <a:t>of the environment. </a:t>
+            </a:r>
+            <a:br>
+              <a:rPr lang="en-US" sz="1400" dirty="0"/>
+            </a:br>
+            <a:r>
+              <a:rPr lang="en-US" sz="1400" dirty="0"/>
+              <a:t>Has deterministic percepts that are 100% reliable.</a:t>
+            </a:r>
+          </a:p>
+          <a:p>
+            <a:pPr marL="0" indent="0">
+              <a:buNone/>
+            </a:pPr>
+            <a:endParaRPr lang="en-US" sz="1400" b="1" dirty="0">
+              <a:solidFill>
+                <a:srgbClr val="FF0000"/>
+              </a:solidFill>
+            </a:endParaRPr>
+          </a:p>
+        </p:txBody>
+      </p:sp>
+      <p:sp>
+        <p:nvSpPr>
+          <p:cNvPr id="29" name="TextBox 28">
+            <a:extLst>
+              <a:ext uri="{FF2B5EF4-FFF2-40B4-BE49-F238E27FC236}">
+                <a16:creationId xmlns:a16="http://schemas.microsoft.com/office/drawing/2014/main" id="{3A47775B-DBDF-30A6-8078-A725B9D1AA64}"/>
+              </a:ext>
+            </a:extLst>
+          </p:cNvPr>
+          <p:cNvSpPr txBox="1"/>
+          <p:nvPr/>
+        </p:nvSpPr>
+        <p:spPr>
+          <a:xfrm>
+            <a:off x="3902869" y="1685808"/>
+            <a:ext cx="590550" cy="369332"/>
+          </a:xfrm>
+          <a:prstGeom prst="rect">
+            <a:avLst/>
+          </a:prstGeom>
+          <a:noFill/>
+        </p:spPr>
+        <p:txBody>
+          <a:bodyPr wrap="square" rtlCol="0">
+            <a:spAutoFit/>
+          </a:bodyPr>
+          <a:lstStyle/>
+          <a:p>
+            <a:r>
+              <a:rPr lang="en-US" b="1" dirty="0">
+                <a:solidFill>
+                  <a:srgbClr val="FF0000"/>
+                </a:solidFill>
+              </a:rPr>
+              <a:t>vs.</a:t>
+            </a:r>
+          </a:p>
+        </p:txBody>
+      </p:sp>
+      <p:sp>
+        <p:nvSpPr>
+          <p:cNvPr id="30" name="TextBox 29">
+            <a:extLst>
+              <a:ext uri="{FF2B5EF4-FFF2-40B4-BE49-F238E27FC236}">
+                <a16:creationId xmlns:a16="http://schemas.microsoft.com/office/drawing/2014/main" id="{E314B86C-16D4-2AFE-3CD3-BF0D06CE53A5}"/>
+              </a:ext>
+            </a:extLst>
+          </p:cNvPr>
+          <p:cNvSpPr txBox="1"/>
+          <p:nvPr/>
+        </p:nvSpPr>
+        <p:spPr>
+          <a:xfrm>
+            <a:off x="4670856" y="1679516"/>
+            <a:ext cx="3495676" cy="1384995"/>
+          </a:xfrm>
+          <a:prstGeom prst="rect">
+            <a:avLst/>
+          </a:prstGeom>
+          <a:noFill/>
+        </p:spPr>
+        <p:txBody>
+          <a:bodyPr wrap="square">
+            <a:spAutoFit/>
+          </a:bodyPr>
+          <a:lstStyle/>
+          <a:p>
+            <a:r>
+              <a:rPr lang="en-US" sz="1400" b="1" dirty="0">
+                <a:solidFill>
+                  <a:srgbClr val="FF0000"/>
+                </a:solidFill>
+              </a:rPr>
+              <a:t>Partially observable: </a:t>
+            </a:r>
+            <a:r>
+              <a:rPr lang="en-US" sz="1400" dirty="0"/>
+              <a:t>The agent’s sensors provide incomplete or noisy information about the </a:t>
+            </a:r>
+            <a:r>
+              <a:rPr lang="en-US" sz="1400" b="1" dirty="0"/>
+              <a:t>state</a:t>
+            </a:r>
+            <a:r>
+              <a:rPr lang="en-US" sz="1400" dirty="0"/>
+              <a:t> of the environment.</a:t>
+            </a:r>
+            <a:br>
+              <a:rPr lang="en-US" sz="1400" dirty="0"/>
+            </a:br>
+            <a:r>
+              <a:rPr lang="en-US" sz="1400" dirty="0"/>
+              <a:t>Noisy information means unreliable stochastic percepts (aka a stochastic sensor model)</a:t>
+            </a:r>
+          </a:p>
+        </p:txBody>
+      </p:sp>
+      <p:sp>
+        <p:nvSpPr>
+          <p:cNvPr id="31" name="TextBox 30">
+            <a:extLst>
+              <a:ext uri="{FF2B5EF4-FFF2-40B4-BE49-F238E27FC236}">
+                <a16:creationId xmlns:a16="http://schemas.microsoft.com/office/drawing/2014/main" id="{B414FFA9-1B92-3F4B-3849-110ADE38424A}"/>
+              </a:ext>
+            </a:extLst>
+          </p:cNvPr>
+          <p:cNvSpPr txBox="1"/>
+          <p:nvPr/>
+        </p:nvSpPr>
+        <p:spPr>
+          <a:xfrm>
+            <a:off x="713261" y="3140832"/>
+            <a:ext cx="3352800" cy="1169551"/>
+          </a:xfrm>
+          <a:prstGeom prst="rect">
+            <a:avLst/>
+          </a:prstGeom>
+          <a:noFill/>
+        </p:spPr>
+        <p:txBody>
+          <a:bodyPr wrap="square">
+            <a:spAutoFit/>
+          </a:bodyPr>
+          <a:lstStyle/>
+          <a:p>
+            <a:pPr marL="0" indent="0">
+              <a:buNone/>
+            </a:pPr>
+            <a:r>
+              <a:rPr lang="en-US" sz="1400" b="1" dirty="0">
+                <a:solidFill>
+                  <a:srgbClr val="FF0000"/>
+                </a:solidFill>
+              </a:rPr>
+              <a:t>Deterministic: </a:t>
+            </a:r>
+          </a:p>
+          <a:p>
+            <a:r>
+              <a:rPr lang="en-US" sz="1400" dirty="0"/>
+              <a:t>Deterministic </a:t>
+            </a:r>
+            <a:r>
+              <a:rPr lang="en-US" sz="1400" b="1" dirty="0"/>
+              <a:t>transition function</a:t>
+            </a:r>
+            <a:r>
+              <a:rPr lang="en-US" sz="1400" dirty="0"/>
+              <a:t>: Changes in the environment are completely determined by the current state of the environment and the agent’s action.</a:t>
+            </a:r>
+          </a:p>
+        </p:txBody>
+      </p:sp>
+      <p:sp>
+        <p:nvSpPr>
+          <p:cNvPr id="32" name="TextBox 31">
+            <a:extLst>
+              <a:ext uri="{FF2B5EF4-FFF2-40B4-BE49-F238E27FC236}">
+                <a16:creationId xmlns:a16="http://schemas.microsoft.com/office/drawing/2014/main" id="{E5E42B62-D95D-36E5-8F59-FB633DABEF5A}"/>
+              </a:ext>
+            </a:extLst>
+          </p:cNvPr>
+          <p:cNvSpPr txBox="1"/>
+          <p:nvPr/>
+        </p:nvSpPr>
+        <p:spPr>
+          <a:xfrm>
+            <a:off x="3902869" y="3488057"/>
+            <a:ext cx="590550" cy="369332"/>
+          </a:xfrm>
+          <a:prstGeom prst="rect">
+            <a:avLst/>
+          </a:prstGeom>
+          <a:noFill/>
+        </p:spPr>
+        <p:txBody>
+          <a:bodyPr wrap="square" rtlCol="0">
+            <a:spAutoFit/>
+          </a:bodyPr>
+          <a:lstStyle/>
+          <a:p>
+            <a:r>
+              <a:rPr lang="en-US" b="1" dirty="0">
+                <a:solidFill>
+                  <a:srgbClr val="FF0000"/>
+                </a:solidFill>
+              </a:rPr>
+              <a:t>vs.</a:t>
+            </a:r>
+          </a:p>
+        </p:txBody>
+      </p:sp>
+      <p:sp>
+        <p:nvSpPr>
+          <p:cNvPr id="33" name="TextBox 32">
+            <a:extLst>
+              <a:ext uri="{FF2B5EF4-FFF2-40B4-BE49-F238E27FC236}">
+                <a16:creationId xmlns:a16="http://schemas.microsoft.com/office/drawing/2014/main" id="{B4C53512-DE58-E40E-D58F-EB59D22B6D8F}"/>
+              </a:ext>
+            </a:extLst>
+          </p:cNvPr>
+          <p:cNvSpPr txBox="1"/>
+          <p:nvPr/>
+        </p:nvSpPr>
+        <p:spPr>
+          <a:xfrm>
+            <a:off x="4726781" y="3124200"/>
+            <a:ext cx="3807619" cy="954107"/>
+          </a:xfrm>
+          <a:prstGeom prst="rect">
+            <a:avLst/>
+          </a:prstGeom>
+          <a:noFill/>
+        </p:spPr>
+        <p:txBody>
+          <a:bodyPr wrap="square">
+            <a:spAutoFit/>
+          </a:bodyPr>
+          <a:lstStyle/>
+          <a:p>
+            <a:pPr marL="0" indent="0">
+              <a:buNone/>
+            </a:pPr>
+            <a:r>
+              <a:rPr lang="en-US" sz="1400" b="1" dirty="0">
+                <a:solidFill>
+                  <a:srgbClr val="FF0000"/>
+                </a:solidFill>
+              </a:rPr>
+              <a:t>Stochastic: </a:t>
+            </a:r>
+          </a:p>
+          <a:p>
+            <a:r>
+              <a:rPr lang="en-US" sz="1400" dirty="0"/>
+              <a:t>Stochastic </a:t>
+            </a:r>
+            <a:r>
+              <a:rPr lang="en-US" sz="1400" b="1" dirty="0"/>
+              <a:t>transition function:  </a:t>
+            </a:r>
+            <a:r>
+              <a:rPr lang="en-US" sz="1400" dirty="0"/>
+              <a:t>leads to transition probabilities and a Markov process.</a:t>
+            </a:r>
+            <a:br>
+              <a:rPr lang="en-US" sz="1400" dirty="0"/>
+            </a:br>
+            <a:endParaRPr lang="en-US" sz="1400" dirty="0"/>
+          </a:p>
+        </p:txBody>
+      </p:sp>
+      <p:sp>
+        <p:nvSpPr>
+          <p:cNvPr id="34" name="Rectangle 33">
+            <a:extLst>
+              <a:ext uri="{FF2B5EF4-FFF2-40B4-BE49-F238E27FC236}">
+                <a16:creationId xmlns:a16="http://schemas.microsoft.com/office/drawing/2014/main" id="{CCE735BC-43C0-1424-80FC-1E666D311E5C}"/>
+              </a:ext>
+              <a:ext uri="{C183D7F6-B498-43B3-948B-1728B52AA6E4}">
+                <adec:decorative xmlns:adec="http://schemas.microsoft.com/office/drawing/2017/decorative" val="1"/>
+              </a:ext>
+            </a:extLst>
+          </p:cNvPr>
+          <p:cNvSpPr/>
+          <p:nvPr/>
+        </p:nvSpPr>
+        <p:spPr>
+          <a:xfrm>
+            <a:off x="555807" y="3213803"/>
+            <a:ext cx="150019" cy="152400"/>
+          </a:xfrm>
+          <a:prstGeom prst="rect">
+            <a:avLst/>
+          </a:prstGeom>
+          <a:noFill/>
+          <a:ln w="28575" cap="flat" cmpd="sng" algn="ctr">
+            <a:solidFill>
+              <a:schemeClr val="dk1"/>
+            </a:solidFill>
+            <a:prstDash val="solid"/>
+            <a:round/>
+            <a:headEnd type="none" w="med" len="med"/>
+            <a:tailEnd type="none" w="med" len="med"/>
+          </a:ln>
+        </p:spPr>
+        <p:style>
+          <a:lnRef idx="0">
+            <a:scrgbClr r="0" g="0" b="0"/>
+          </a:lnRef>
+          <a:fillRef idx="0">
+            <a:scrgbClr r="0" g="0" b="0"/>
+          </a:fillRef>
+          <a:effectRef idx="0">
+            <a:scrgbClr r="0" g="0" b="0"/>
+          </a:effectRef>
+          <a:fontRef idx="minor">
+            <a:schemeClr val="dk1"/>
+          </a:fontRef>
+        </p:style>
+        <p:txBody>
+          <a:bodyPr rtlCol="0" anchor="ctr"/>
+          <a:lstStyle/>
+          <a:p>
+            <a:pPr algn="ctr"/>
+            <a:endParaRPr lang="en-US"/>
+          </a:p>
+        </p:txBody>
+      </p:sp>
+      <p:sp>
+        <p:nvSpPr>
+          <p:cNvPr id="35" name="Rectangle 34">
+            <a:extLst>
+              <a:ext uri="{FF2B5EF4-FFF2-40B4-BE49-F238E27FC236}">
+                <a16:creationId xmlns:a16="http://schemas.microsoft.com/office/drawing/2014/main" id="{CD3CEA96-E39D-3641-4315-C8A88FDC9138}"/>
+              </a:ext>
+              <a:ext uri="{C183D7F6-B498-43B3-948B-1728B52AA6E4}">
+                <adec:decorative xmlns:adec="http://schemas.microsoft.com/office/drawing/2017/decorative" val="1"/>
+              </a:ext>
+            </a:extLst>
+          </p:cNvPr>
+          <p:cNvSpPr/>
+          <p:nvPr/>
+        </p:nvSpPr>
+        <p:spPr>
+          <a:xfrm>
+            <a:off x="555807" y="1720514"/>
+            <a:ext cx="150019" cy="152400"/>
+          </a:xfrm>
+          <a:prstGeom prst="rect">
+            <a:avLst/>
+          </a:prstGeom>
+          <a:noFill/>
+          <a:ln w="28575" cap="flat" cmpd="sng" algn="ctr">
+            <a:solidFill>
+              <a:schemeClr val="dk1"/>
+            </a:solidFill>
+            <a:prstDash val="solid"/>
+            <a:round/>
+            <a:headEnd type="none" w="med" len="med"/>
+            <a:tailEnd type="none" w="med" len="med"/>
+          </a:ln>
+        </p:spPr>
+        <p:style>
+          <a:lnRef idx="0">
+            <a:scrgbClr r="0" g="0" b="0"/>
+          </a:lnRef>
+          <a:fillRef idx="0">
+            <a:scrgbClr r="0" g="0" b="0"/>
+          </a:fillRef>
+          <a:effectRef idx="0">
+            <a:scrgbClr r="0" g="0" b="0"/>
+          </a:effectRef>
+          <a:fontRef idx="minor">
+            <a:schemeClr val="dk1"/>
+          </a:fontRef>
+        </p:style>
+        <p:txBody>
+          <a:bodyPr rtlCol="0" anchor="ctr"/>
+          <a:lstStyle/>
+          <a:p>
+            <a:pPr algn="ctr"/>
+            <a:endParaRPr lang="en-US"/>
+          </a:p>
+        </p:txBody>
+      </p:sp>
+      <p:sp>
+        <p:nvSpPr>
+          <p:cNvPr id="36" name="Rectangle 35">
+            <a:extLst>
+              <a:ext uri="{FF2B5EF4-FFF2-40B4-BE49-F238E27FC236}">
+                <a16:creationId xmlns:a16="http://schemas.microsoft.com/office/drawing/2014/main" id="{1708EE67-7246-E4AF-7B81-56A6C9A2994B}"/>
+              </a:ext>
+              <a:ext uri="{C183D7F6-B498-43B3-948B-1728B52AA6E4}">
+                <adec:decorative xmlns:adec="http://schemas.microsoft.com/office/drawing/2017/decorative" val="1"/>
+              </a:ext>
+            </a:extLst>
+          </p:cNvPr>
+          <p:cNvSpPr/>
+          <p:nvPr/>
+        </p:nvSpPr>
+        <p:spPr>
+          <a:xfrm>
+            <a:off x="4553525" y="3226652"/>
+            <a:ext cx="150019" cy="152400"/>
+          </a:xfrm>
+          <a:prstGeom prst="rect">
+            <a:avLst/>
+          </a:prstGeom>
+          <a:noFill/>
+          <a:ln w="28575" cap="flat" cmpd="sng" algn="ctr">
+            <a:solidFill>
+              <a:schemeClr val="dk1"/>
+            </a:solidFill>
+            <a:prstDash val="solid"/>
+            <a:round/>
+            <a:headEnd type="none" w="med" len="med"/>
+            <a:tailEnd type="none" w="med" len="med"/>
+          </a:ln>
+        </p:spPr>
+        <p:style>
+          <a:lnRef idx="0">
+            <a:scrgbClr r="0" g="0" b="0"/>
+          </a:lnRef>
+          <a:fillRef idx="0">
+            <a:scrgbClr r="0" g="0" b="0"/>
+          </a:fillRef>
+          <a:effectRef idx="0">
+            <a:scrgbClr r="0" g="0" b="0"/>
+          </a:effectRef>
+          <a:fontRef idx="minor">
+            <a:schemeClr val="dk1"/>
+          </a:fontRef>
+        </p:style>
+        <p:txBody>
+          <a:bodyPr rtlCol="0" anchor="ctr"/>
+          <a:lstStyle/>
+          <a:p>
+            <a:pPr algn="ctr"/>
+            <a:endParaRPr lang="en-US"/>
+          </a:p>
+        </p:txBody>
+      </p:sp>
+      <p:sp>
+        <p:nvSpPr>
+          <p:cNvPr id="37" name="Rectangle 36">
+            <a:extLst>
+              <a:ext uri="{FF2B5EF4-FFF2-40B4-BE49-F238E27FC236}">
+                <a16:creationId xmlns:a16="http://schemas.microsoft.com/office/drawing/2014/main" id="{5BBE6D01-2F08-F6F8-5A75-C2558533B2F5}"/>
+              </a:ext>
+              <a:ext uri="{C183D7F6-B498-43B3-948B-1728B52AA6E4}">
+                <adec:decorative xmlns:adec="http://schemas.microsoft.com/office/drawing/2017/decorative" val="1"/>
+              </a:ext>
+            </a:extLst>
+          </p:cNvPr>
+          <p:cNvSpPr/>
+          <p:nvPr/>
+        </p:nvSpPr>
+        <p:spPr>
+          <a:xfrm>
+            <a:off x="4547931" y="1776630"/>
+            <a:ext cx="150019" cy="152400"/>
+          </a:xfrm>
+          <a:prstGeom prst="rect">
+            <a:avLst/>
+          </a:prstGeom>
+          <a:noFill/>
+          <a:ln w="28575" cap="flat" cmpd="sng" algn="ctr">
+            <a:solidFill>
+              <a:schemeClr val="dk1"/>
+            </a:solidFill>
+            <a:prstDash val="solid"/>
+            <a:round/>
+            <a:headEnd type="none" w="med" len="med"/>
+            <a:tailEnd type="none" w="med" len="med"/>
+          </a:ln>
+        </p:spPr>
+        <p:style>
+          <a:lnRef idx="0">
+            <a:scrgbClr r="0" g="0" b="0"/>
+          </a:lnRef>
+          <a:fillRef idx="0">
+            <a:scrgbClr r="0" g="0" b="0"/>
+          </a:fillRef>
+          <a:effectRef idx="0">
+            <a:scrgbClr r="0" g="0" b="0"/>
+          </a:effectRef>
+          <a:fontRef idx="minor">
+            <a:schemeClr val="dk1"/>
+          </a:fontRef>
+        </p:style>
+        <p:txBody>
+          <a:bodyPr rtlCol="0" anchor="ctr"/>
+          <a:lstStyle/>
+          <a:p>
+            <a:pPr algn="ctr"/>
+            <a:endParaRPr lang="en-US"/>
+          </a:p>
+        </p:txBody>
+      </p:sp>
     </p:spTree>
     <p:extLst>
       <p:ext uri="{BB962C8B-B14F-4D97-AF65-F5344CB8AC3E}">
@@ -22458,226 +22630,7 @@
 </p:sld>
 </file>
 
-<file path=ppt/slides/slide2.xml><?xml version="1.0" encoding="utf-8"?>
-<p:sld xmlns:a="http://schemas.openxmlformats.org/drawingml/2006/main" xmlns:r="http://schemas.openxmlformats.org/officeDocument/2006/relationships" xmlns:p="http://schemas.openxmlformats.org/presentationml/2006/main">
-  <p:cSld>
-    <p:bg>
-      <p:bgPr>
-        <a:solidFill>
-          <a:srgbClr val="000000"/>
-        </a:solidFill>
-        <a:effectLst/>
-      </p:bgPr>
-    </p:bg>
-    <p:spTree>
-      <p:nvGrpSpPr>
-        <p:cNvPr id="1" name=""/>
-        <p:cNvGrpSpPr/>
-        <p:nvPr/>
-      </p:nvGrpSpPr>
-      <p:grpSpPr>
-        <a:xfrm>
-          <a:off x="0" y="0"/>
-          <a:ext cx="0" cy="0"/>
-          <a:chOff x="0" y="0"/>
-          <a:chExt cx="0" cy="0"/>
-        </a:xfrm>
-      </p:grpSpPr>
-      <p:sp>
-        <p:nvSpPr>
-          <p:cNvPr id="11" name="Rectangle 10">
-            <a:extLst>
-              <a:ext uri="{FF2B5EF4-FFF2-40B4-BE49-F238E27FC236}">
-                <a16:creationId xmlns:a16="http://schemas.microsoft.com/office/drawing/2014/main" id="{71B2258F-86CA-4D4D-8270-BC05FCDEBFB3}"/>
-              </a:ext>
-              <a:ext uri="{C183D7F6-B498-43B3-948B-1728B52AA6E4}">
-                <adec:decorative xmlns:adec="http://schemas.microsoft.com/office/drawing/2017/decorative" val="1"/>
-              </a:ext>
-            </a:extLst>
-          </p:cNvPr>
-          <p:cNvSpPr>
-            <a:spLocks noGrp="1" noRot="1" noChangeAspect="1" noMove="1" noResize="1" noEditPoints="1" noAdjustHandles="1" noChangeArrowheads="1" noChangeShapeType="1" noTextEdit="1"/>
-          </p:cNvSpPr>
-          <p:nvPr>
-            <p:extLst>
-              <p:ext uri="{386F3935-93C4-4BCD-93E2-E3B085C9AB24}">
-                <p16:designElem xmlns:p16="http://schemas.microsoft.com/office/powerpoint/2015/main" val="1"/>
-              </p:ext>
-            </p:extLst>
-          </p:nvPr>
-        </p:nvSpPr>
-        <p:spPr>
-          <a:xfrm>
-            <a:off x="0" y="0"/>
-            <a:ext cx="9144000" cy="6857999"/>
-          </a:xfrm>
-          <a:prstGeom prst="rect">
-            <a:avLst/>
-          </a:prstGeom>
-          <a:solidFill>
-            <a:srgbClr val="000000"/>
-          </a:solidFill>
-          <a:ln>
-            <a:noFill/>
-          </a:ln>
-        </p:spPr>
-        <p:style>
-          <a:lnRef idx="2">
-            <a:schemeClr val="accent1">
-              <a:shade val="50000"/>
-            </a:schemeClr>
-          </a:lnRef>
-          <a:fillRef idx="1">
-            <a:schemeClr val="accent1"/>
-          </a:fillRef>
-          <a:effectRef idx="0">
-            <a:schemeClr val="accent1"/>
-          </a:effectRef>
-          <a:fontRef idx="minor">
-            <a:schemeClr val="lt1"/>
-          </a:fontRef>
-        </p:style>
-        <p:txBody>
-          <a:bodyPr rtlCol="0" anchor="ctr"/>
-          <a:lstStyle/>
-          <a:p>
-            <a:pPr algn="ctr"/>
-            <a:endParaRPr lang="en-US"/>
-          </a:p>
-        </p:txBody>
-      </p:sp>
-      <p:pic>
-        <p:nvPicPr>
-          <p:cNvPr id="6" name="Picture 14">
-            <a:extLst>
-              <a:ext uri="{FF2B5EF4-FFF2-40B4-BE49-F238E27FC236}">
-                <a16:creationId xmlns:a16="http://schemas.microsoft.com/office/drawing/2014/main" id="{E4F041C0-7D5C-CB2F-92DA-37E6B770851E}"/>
-              </a:ext>
-              <a:ext uri="{C183D7F6-B498-43B3-948B-1728B52AA6E4}">
-                <adec:decorative xmlns:adec="http://schemas.microsoft.com/office/drawing/2017/decorative" val="1"/>
-              </a:ext>
-            </a:extLst>
-          </p:cNvPr>
-          <p:cNvPicPr>
-            <a:picLocks noChangeAspect="1" noChangeArrowheads="1"/>
-          </p:cNvPicPr>
-          <p:nvPr/>
-        </p:nvPicPr>
-        <p:blipFill rotWithShape="1">
-          <a:blip r:embed="rId2" cstate="print">
-            <a:alphaModFix amt="50000"/>
-          </a:blip>
-          <a:srcRect t="27493" b="22444"/>
-          <a:stretch>
-            <a:fillRect/>
-          </a:stretch>
-        </p:blipFill>
-        <p:spPr bwMode="auto">
-          <a:xfrm>
-            <a:off x="20" y="1"/>
-            <a:ext cx="9143980" cy="6857999"/>
-          </a:xfrm>
-          <a:prstGeom prst="rect">
-            <a:avLst/>
-          </a:prstGeom>
-          <a:noFill/>
-        </p:spPr>
-      </p:pic>
-      <p:sp>
-        <p:nvSpPr>
-          <p:cNvPr id="4" name="Title 3">
-            <a:extLst>
-              <a:ext uri="{FF2B5EF4-FFF2-40B4-BE49-F238E27FC236}">
-                <a16:creationId xmlns:a16="http://schemas.microsoft.com/office/drawing/2014/main" id="{110C9F2C-5F20-241B-A7B4-23BCD535D7A9}"/>
-              </a:ext>
-            </a:extLst>
-          </p:cNvPr>
-          <p:cNvSpPr>
-            <a:spLocks noGrp="1"/>
-          </p:cNvSpPr>
-          <p:nvPr>
-            <p:ph type="title"/>
-          </p:nvPr>
-        </p:nvSpPr>
-        <p:spPr>
-          <a:xfrm>
-            <a:off x="1143000" y="1122362"/>
-            <a:ext cx="6858000" cy="2900518"/>
-          </a:xfrm>
-        </p:spPr>
-        <p:txBody>
-          <a:bodyPr vert="horz" lIns="91440" tIns="45720" rIns="91440" bIns="45720" rtlCol="0" anchor="b">
-            <a:normAutofit/>
-          </a:bodyPr>
-          <a:lstStyle/>
-          <a:p>
-            <a:pPr algn="ctr" defTabSz="914400"/>
-            <a:r>
-              <a:rPr lang="en-US" sz="6000" dirty="0">
-                <a:solidFill>
-                  <a:srgbClr val="FFFFFF"/>
-                </a:solidFill>
-              </a:rPr>
-              <a:t>Module Review 1</a:t>
-            </a:r>
-          </a:p>
-        </p:txBody>
-      </p:sp>
-      <p:sp>
-        <p:nvSpPr>
-          <p:cNvPr id="5" name="Text Placeholder 4">
-            <a:extLst>
-              <a:ext uri="{FF2B5EF4-FFF2-40B4-BE49-F238E27FC236}">
-                <a16:creationId xmlns:a16="http://schemas.microsoft.com/office/drawing/2014/main" id="{702CF149-4E3E-4BC7-1591-E633BE8275BB}"/>
-              </a:ext>
-            </a:extLst>
-          </p:cNvPr>
-          <p:cNvSpPr>
-            <a:spLocks noGrp="1"/>
-          </p:cNvSpPr>
-          <p:nvPr>
-            <p:ph type="body" idx="1"/>
-          </p:nvPr>
-        </p:nvSpPr>
-        <p:spPr>
-          <a:xfrm>
-            <a:off x="1143000" y="4159404"/>
-            <a:ext cx="6858000" cy="1098395"/>
-          </a:xfrm>
-        </p:spPr>
-        <p:txBody>
-          <a:bodyPr vert="horz" lIns="91440" tIns="45720" rIns="91440" bIns="45720" rtlCol="0">
-            <a:normAutofit/>
-          </a:bodyPr>
-          <a:lstStyle/>
-          <a:p>
-            <a:pPr algn="ctr" defTabSz="914400">
-              <a:spcBef>
-                <a:spcPts val="1000"/>
-              </a:spcBef>
-            </a:pPr>
-            <a:endParaRPr lang="en-US" sz="2400">
-              <a:solidFill>
-                <a:srgbClr val="FFFFFF"/>
-              </a:solidFill>
-            </a:endParaRPr>
-          </a:p>
-        </p:txBody>
-      </p:sp>
-    </p:spTree>
-    <p:extLst>
-      <p:ext uri="{BB962C8B-B14F-4D97-AF65-F5344CB8AC3E}">
-        <p14:creationId xmlns:p14="http://schemas.microsoft.com/office/powerpoint/2010/main" val="499141692"/>
-      </p:ext>
-    </p:extLst>
-  </p:cSld>
-  <p:clrMapOvr>
-    <a:overrideClrMapping bg1="dk1" tx1="lt1" bg2="dk2" tx2="lt2" accent1="accent1" accent2="accent2" accent3="accent3" accent4="accent4" accent5="accent5" accent6="accent6" hlink="hlink" folHlink="folHlink"/>
-  </p:clrMapOvr>
-</p:sld>
-</file>
-
-<file path=ppt/slides/slide20.xml><?xml version="1.0" encoding="utf-8"?>
+<file path=ppt/slides/slide21.xml><?xml version="1.0" encoding="utf-8"?>
 <p:sld xmlns:a="http://schemas.openxmlformats.org/drawingml/2006/main" xmlns:r="http://schemas.openxmlformats.org/officeDocument/2006/relationships" xmlns:p="http://schemas.openxmlformats.org/presentationml/2006/main">
   <p:cSld>
     <p:spTree>
@@ -23383,7 +23336,7 @@
 </p:sld>
 </file>
 
-<file path=ppt/slides/slide21.xml><?xml version="1.0" encoding="utf-8"?>
+<file path=ppt/slides/slide22.xml><?xml version="1.0" encoding="utf-8"?>
 <p:sld xmlns:a="http://schemas.openxmlformats.org/drawingml/2006/main" xmlns:r="http://schemas.openxmlformats.org/officeDocument/2006/relationships" xmlns:p="http://schemas.openxmlformats.org/presentationml/2006/main">
   <p:cSld>
     <p:spTree>
@@ -23652,7 +23605,7 @@
 </p:sld>
 </file>
 
-<file path=ppt/slides/slide22.xml><?xml version="1.0" encoding="utf-8"?>
+<file path=ppt/slides/slide23.xml><?xml version="1.0" encoding="utf-8"?>
 <p:sld xmlns:a="http://schemas.openxmlformats.org/drawingml/2006/main" xmlns:r="http://schemas.openxmlformats.org/officeDocument/2006/relationships" xmlns:p="http://schemas.openxmlformats.org/presentationml/2006/main">
   <p:cSld>
     <p:spTree>
@@ -24285,6 +24238,98 @@
       <p:bldP spid="3" grpId="0" build="p"/>
     </p:bldLst>
   </p:timing>
+</p:sld>
+</file>
+
+<file path=ppt/slides/slide24.xml><?xml version="1.0" encoding="utf-8"?>
+<p:sld xmlns:a="http://schemas.openxmlformats.org/drawingml/2006/main" xmlns:r="http://schemas.openxmlformats.org/officeDocument/2006/relationships" xmlns:p="http://schemas.openxmlformats.org/presentationml/2006/main">
+  <p:cSld>
+    <p:spTree>
+      <p:nvGrpSpPr>
+        <p:cNvPr id="1" name="">
+          <a:extLst>
+            <a:ext uri="{FF2B5EF4-FFF2-40B4-BE49-F238E27FC236}">
+              <a16:creationId xmlns:a16="http://schemas.microsoft.com/office/drawing/2014/main" id="{AA87AD58-0FFB-3FEA-2D02-19846ECFB2F3}"/>
+            </a:ext>
+          </a:extLst>
+        </p:cNvPr>
+        <p:cNvGrpSpPr/>
+        <p:nvPr/>
+      </p:nvGrpSpPr>
+      <p:grpSpPr>
+        <a:xfrm>
+          <a:off x="0" y="0"/>
+          <a:ext cx="0" cy="0"/>
+          <a:chOff x="0" y="0"/>
+          <a:chExt cx="0" cy="0"/>
+        </a:xfrm>
+      </p:grpSpPr>
+      <p:sp>
+        <p:nvSpPr>
+          <p:cNvPr id="4" name="Title 3">
+            <a:extLst>
+              <a:ext uri="{FF2B5EF4-FFF2-40B4-BE49-F238E27FC236}">
+                <a16:creationId xmlns:a16="http://schemas.microsoft.com/office/drawing/2014/main" id="{0266BF2C-073A-E61B-F314-D1327A8F4903}"/>
+              </a:ext>
+            </a:extLst>
+          </p:cNvPr>
+          <p:cNvSpPr>
+            <a:spLocks noGrp="1"/>
+          </p:cNvSpPr>
+          <p:nvPr>
+            <p:ph type="title"/>
+          </p:nvPr>
+        </p:nvSpPr>
+        <p:spPr/>
+        <p:txBody>
+          <a:bodyPr/>
+          <a:lstStyle/>
+          <a:p>
+            <a:r>
+              <a:rPr lang="en-US" dirty="0"/>
+              <a:t>Assignment 1</a:t>
+            </a:r>
+          </a:p>
+        </p:txBody>
+      </p:sp>
+      <p:sp>
+        <p:nvSpPr>
+          <p:cNvPr id="5" name="Text Placeholder 4">
+            <a:extLst>
+              <a:ext uri="{FF2B5EF4-FFF2-40B4-BE49-F238E27FC236}">
+                <a16:creationId xmlns:a16="http://schemas.microsoft.com/office/drawing/2014/main" id="{E8268822-6F82-4F45-B3D4-2541D6F59527}"/>
+              </a:ext>
+            </a:extLst>
+          </p:cNvPr>
+          <p:cNvSpPr>
+            <a:spLocks noGrp="1"/>
+          </p:cNvSpPr>
+          <p:nvPr>
+            <p:ph type="body" idx="1"/>
+          </p:nvPr>
+        </p:nvSpPr>
+        <p:spPr/>
+        <p:txBody>
+          <a:bodyPr/>
+          <a:lstStyle/>
+          <a:p>
+            <a:r>
+              <a:rPr lang="en-US" dirty="0"/>
+              <a:t>Reflex Agents</a:t>
+            </a:r>
+          </a:p>
+        </p:txBody>
+      </p:sp>
+    </p:spTree>
+    <p:extLst>
+      <p:ext uri="{BB962C8B-B14F-4D97-AF65-F5344CB8AC3E}">
+        <p14:creationId xmlns:p14="http://schemas.microsoft.com/office/powerpoint/2010/main" val="483190766"/>
+      </p:ext>
+    </p:extLst>
+  </p:cSld>
+  <p:clrMapOvr>
+    <a:masterClrMapping/>
+  </p:clrMapOvr>
 </p:sld>
 </file>
 

</xml_diff>